<commit_message>
Update text and images
</commit_message>
<xml_diff>
--- a/static/images/discrete_guidance.pptx
+++ b/static/images/discrete_guidance.pptx
@@ -259,7 +259,7 @@
           <a:p>
             <a:fld id="{9569D325-661A-4648-990C-44DFCBF22615}" type="datetimeFigureOut">
               <a:rPr lang="en-US" smtClean="0"/>
-              <a:t>10/30/24</a:t>
+              <a:t>11/8/24</a:t>
             </a:fld>
             <a:endParaRPr lang="en-US"/>
           </a:p>
@@ -457,7 +457,7 @@
           <a:p>
             <a:fld id="{9569D325-661A-4648-990C-44DFCBF22615}" type="datetimeFigureOut">
               <a:rPr lang="en-US" smtClean="0"/>
-              <a:t>10/30/24</a:t>
+              <a:t>11/8/24</a:t>
             </a:fld>
             <a:endParaRPr lang="en-US"/>
           </a:p>
@@ -665,7 +665,7 @@
           <a:p>
             <a:fld id="{9569D325-661A-4648-990C-44DFCBF22615}" type="datetimeFigureOut">
               <a:rPr lang="en-US" smtClean="0"/>
-              <a:t>10/30/24</a:t>
+              <a:t>11/8/24</a:t>
             </a:fld>
             <a:endParaRPr lang="en-US"/>
           </a:p>
@@ -863,7 +863,7 @@
           <a:p>
             <a:fld id="{9569D325-661A-4648-990C-44DFCBF22615}" type="datetimeFigureOut">
               <a:rPr lang="en-US" smtClean="0"/>
-              <a:t>10/30/24</a:t>
+              <a:t>11/8/24</a:t>
             </a:fld>
             <a:endParaRPr lang="en-US"/>
           </a:p>
@@ -1138,7 +1138,7 @@
           <a:p>
             <a:fld id="{9569D325-661A-4648-990C-44DFCBF22615}" type="datetimeFigureOut">
               <a:rPr lang="en-US" smtClean="0"/>
-              <a:t>10/30/24</a:t>
+              <a:t>11/8/24</a:t>
             </a:fld>
             <a:endParaRPr lang="en-US"/>
           </a:p>
@@ -1403,7 +1403,7 @@
           <a:p>
             <a:fld id="{9569D325-661A-4648-990C-44DFCBF22615}" type="datetimeFigureOut">
               <a:rPr lang="en-US" smtClean="0"/>
-              <a:t>10/30/24</a:t>
+              <a:t>11/8/24</a:t>
             </a:fld>
             <a:endParaRPr lang="en-US"/>
           </a:p>
@@ -1815,7 +1815,7 @@
           <a:p>
             <a:fld id="{9569D325-661A-4648-990C-44DFCBF22615}" type="datetimeFigureOut">
               <a:rPr lang="en-US" smtClean="0"/>
-              <a:t>10/30/24</a:t>
+              <a:t>11/8/24</a:t>
             </a:fld>
             <a:endParaRPr lang="en-US"/>
           </a:p>
@@ -1956,7 +1956,7 @@
           <a:p>
             <a:fld id="{9569D325-661A-4648-990C-44DFCBF22615}" type="datetimeFigureOut">
               <a:rPr lang="en-US" smtClean="0"/>
-              <a:t>10/30/24</a:t>
+              <a:t>11/8/24</a:t>
             </a:fld>
             <a:endParaRPr lang="en-US"/>
           </a:p>
@@ -2069,7 +2069,7 @@
           <a:p>
             <a:fld id="{9569D325-661A-4648-990C-44DFCBF22615}" type="datetimeFigureOut">
               <a:rPr lang="en-US" smtClean="0"/>
-              <a:t>10/30/24</a:t>
+              <a:t>11/8/24</a:t>
             </a:fld>
             <a:endParaRPr lang="en-US"/>
           </a:p>
@@ -2380,7 +2380,7 @@
           <a:p>
             <a:fld id="{9569D325-661A-4648-990C-44DFCBF22615}" type="datetimeFigureOut">
               <a:rPr lang="en-US" smtClean="0"/>
-              <a:t>10/30/24</a:t>
+              <a:t>11/8/24</a:t>
             </a:fld>
             <a:endParaRPr lang="en-US"/>
           </a:p>
@@ -2668,7 +2668,7 @@
           <a:p>
             <a:fld id="{9569D325-661A-4648-990C-44DFCBF22615}" type="datetimeFigureOut">
               <a:rPr lang="en-US" smtClean="0"/>
-              <a:t>10/30/24</a:t>
+              <a:t>11/8/24</a:t>
             </a:fld>
             <a:endParaRPr lang="en-US"/>
           </a:p>
@@ -2909,7 +2909,7 @@
           <a:p>
             <a:fld id="{9569D325-661A-4648-990C-44DFCBF22615}" type="datetimeFigureOut">
               <a:rPr lang="en-US" smtClean="0"/>
-              <a:t>10/30/24</a:t>
+              <a:t>11/8/24</a:t>
             </a:fld>
             <a:endParaRPr lang="en-US"/>
           </a:p>
@@ -3342,8 +3342,8 @@
         </p:nvSpPr>
         <p:spPr>
           <a:xfrm>
-            <a:off x="3567906" y="6012948"/>
-            <a:ext cx="5159375" cy="743954"/>
+            <a:off x="3161258" y="6237739"/>
+            <a:ext cx="5159375" cy="525749"/>
           </a:xfrm>
           <a:prstGeom prst="rect">
             <a:avLst/>
@@ -3410,7 +3410,18 @@
                   <a:srgbClr val="C00000"/>
                 </a:solidFill>
               </a:rPr>
-              <a:t> today</a:t>
+              <a:t> </a:t>
+            </a:r>
+            <a:r>
+              <a:rPr lang="en-US" sz="2400" b="1" dirty="0">
+                <a:solidFill>
+                  <a:schemeClr val="tx2">
+                    <a:lumMod val="75000"/>
+                    <a:lumOff val="25000"/>
+                  </a:schemeClr>
+                </a:solidFill>
+              </a:rPr>
+              <a:t>mat</a:t>
             </a:r>
           </a:p>
         </p:txBody>
@@ -3429,7 +3440,7 @@
         </p:nvSpPr>
         <p:spPr>
           <a:xfrm>
-            <a:off x="4879184" y="6184648"/>
+            <a:off x="4586836" y="6319251"/>
             <a:ext cx="914400" cy="371977"/>
           </a:xfrm>
           <a:prstGeom prst="roundRect">
@@ -3491,7 +3502,7 @@
         </p:blipFill>
         <p:spPr bwMode="auto">
           <a:xfrm>
-            <a:off x="8341517" y="6150225"/>
+            <a:off x="7704438" y="6237739"/>
             <a:ext cx="685800" cy="406400"/>
           </a:xfrm>
           <a:prstGeom prst="rect">
@@ -3538,7 +3549,7 @@
         </p:blipFill>
         <p:spPr bwMode="auto">
           <a:xfrm>
-            <a:off x="2598811" y="831311"/>
+            <a:off x="9512804" y="50061"/>
             <a:ext cx="1485900" cy="1485900"/>
           </a:xfrm>
           <a:prstGeom prst="rect">
@@ -3585,7 +3596,7 @@
         </p:blipFill>
         <p:spPr bwMode="auto">
           <a:xfrm>
-            <a:off x="3183011" y="1428211"/>
+            <a:off x="10097004" y="637817"/>
             <a:ext cx="361950" cy="361950"/>
           </a:xfrm>
           <a:prstGeom prst="rect">
@@ -3632,7 +3643,7 @@
         </p:blipFill>
         <p:spPr bwMode="auto">
           <a:xfrm>
-            <a:off x="3671961" y="831311"/>
+            <a:off x="10585954" y="50061"/>
             <a:ext cx="196850" cy="239032"/>
           </a:xfrm>
           <a:prstGeom prst="rect">
@@ -3666,7 +3677,7 @@
         </p:nvSpPr>
         <p:spPr>
           <a:xfrm>
-            <a:off x="502474" y="4923904"/>
+            <a:off x="502474" y="5214193"/>
             <a:ext cx="5353814" cy="743954"/>
           </a:xfrm>
           <a:prstGeom prst="rect">
@@ -3720,12 +3731,15 @@
         </p:nvCxnSpPr>
         <p:spPr>
           <a:xfrm>
-            <a:off x="528636" y="2663013"/>
+            <a:off x="528636" y="2871006"/>
             <a:ext cx="0" cy="2286000"/>
           </a:xfrm>
           <a:prstGeom prst="line">
             <a:avLst/>
           </a:prstGeom>
+          <a:ln>
+            <a:headEnd type="arrow"/>
+          </a:ln>
         </p:spPr>
         <p:style>
           <a:lnRef idx="2">
@@ -3758,7 +3772,7 @@
         </p:nvCxnSpPr>
         <p:spPr>
           <a:xfrm flipH="1">
-            <a:off x="528636" y="4952800"/>
+            <a:off x="528636" y="5160793"/>
             <a:ext cx="5213350" cy="0"/>
           </a:xfrm>
           <a:prstGeom prst="line">
@@ -3794,7 +3808,7 @@
         </p:nvSpPr>
         <p:spPr>
           <a:xfrm>
-            <a:off x="627349" y="3543602"/>
+            <a:off x="627349" y="3751595"/>
             <a:ext cx="190500" cy="1409198"/>
           </a:xfrm>
           <a:prstGeom prst="roundRect">
@@ -3856,7 +3870,7 @@
         </p:nvSpPr>
         <p:spPr>
           <a:xfrm>
-            <a:off x="1484311" y="4587040"/>
+            <a:off x="1484311" y="4795033"/>
             <a:ext cx="190500" cy="365760"/>
           </a:xfrm>
           <a:prstGeom prst="roundRect">
@@ -3918,7 +3932,7 @@
         </p:nvSpPr>
         <p:spPr>
           <a:xfrm>
-            <a:off x="2355996" y="3855520"/>
+            <a:off x="2355996" y="4063513"/>
             <a:ext cx="190500" cy="1097280"/>
           </a:xfrm>
           <a:prstGeom prst="roundRect">
@@ -3980,7 +3994,7 @@
         </p:nvSpPr>
         <p:spPr>
           <a:xfrm>
-            <a:off x="3100823" y="4678480"/>
+            <a:off x="3100823" y="4886473"/>
             <a:ext cx="190500" cy="274320"/>
           </a:xfrm>
           <a:prstGeom prst="roundRect">
@@ -4042,7 +4056,7 @@
         </p:nvSpPr>
         <p:spPr>
           <a:xfrm>
-            <a:off x="3777827" y="4861360"/>
+            <a:off x="3777827" y="5069353"/>
             <a:ext cx="190500" cy="91440"/>
           </a:xfrm>
           <a:prstGeom prst="roundRect">
@@ -4104,7 +4118,7 @@
         </p:nvSpPr>
         <p:spPr>
           <a:xfrm>
-            <a:off x="4503011" y="4312720"/>
+            <a:off x="4503011" y="4520713"/>
             <a:ext cx="190500" cy="640080"/>
           </a:xfrm>
           <a:prstGeom prst="roundRect">
@@ -4166,7 +4180,7 @@
         </p:nvSpPr>
         <p:spPr>
           <a:xfrm>
-            <a:off x="4839566" y="1718876"/>
+            <a:off x="2982597" y="611235"/>
             <a:ext cx="914400" cy="371977"/>
           </a:xfrm>
           <a:prstGeom prst="roundRect">
@@ -4215,7 +4229,7 @@
         </p:nvSpPr>
         <p:spPr>
           <a:xfrm>
-            <a:off x="4417940" y="1540830"/>
+            <a:off x="2522871" y="424045"/>
             <a:ext cx="1757651" cy="743954"/>
           </a:xfrm>
           <a:prstGeom prst="rect">
@@ -4282,7 +4296,7 @@
         </p:nvSpPr>
         <p:spPr>
           <a:xfrm>
-            <a:off x="3484927" y="1543137"/>
+            <a:off x="1589858" y="435496"/>
             <a:ext cx="5159375" cy="743954"/>
           </a:xfrm>
           <a:prstGeom prst="rect">
@@ -4322,7 +4336,7 @@
                   </a:schemeClr>
                 </a:solidFill>
               </a:rPr>
-              <a:t>The                   sat on the today</a:t>
+              <a:t>The                   sat on the mat</a:t>
             </a:r>
           </a:p>
         </p:txBody>
@@ -4356,7 +4370,7 @@
         </p:blipFill>
         <p:spPr bwMode="auto">
           <a:xfrm>
-            <a:off x="5637286" y="1185180"/>
+            <a:off x="5994984" y="519509"/>
             <a:ext cx="3505200" cy="444500"/>
           </a:xfrm>
           <a:prstGeom prst="rect">
@@ -4388,7 +4402,7 @@
         </p:nvSpPr>
         <p:spPr>
           <a:xfrm>
-            <a:off x="891448" y="4587040"/>
+            <a:off x="891448" y="4795033"/>
             <a:ext cx="190500" cy="365760"/>
           </a:xfrm>
           <a:prstGeom prst="roundRect">
@@ -4450,7 +4464,7 @@
         </p:nvSpPr>
         <p:spPr>
           <a:xfrm>
-            <a:off x="2606309" y="3124000"/>
+            <a:off x="2606309" y="3331993"/>
             <a:ext cx="190500" cy="1828800"/>
           </a:xfrm>
           <a:prstGeom prst="roundRect">
@@ -4512,7 +4526,7 @@
         </p:nvSpPr>
         <p:spPr>
           <a:xfrm>
-            <a:off x="4747782" y="4678480"/>
+            <a:off x="4747782" y="4886473"/>
             <a:ext cx="190500" cy="274320"/>
           </a:xfrm>
           <a:prstGeom prst="roundRect">
@@ -4576,7 +4590,7 @@
         </p:nvSpPr>
         <p:spPr>
           <a:xfrm>
-            <a:off x="6350151" y="4923904"/>
+            <a:off x="6350151" y="5214193"/>
             <a:ext cx="5353814" cy="743954"/>
           </a:xfrm>
           <a:prstGeom prst="rect">
@@ -4630,12 +4644,15 @@
         </p:nvCxnSpPr>
         <p:spPr>
           <a:xfrm>
-            <a:off x="6376313" y="2663013"/>
+            <a:off x="6376313" y="2871006"/>
             <a:ext cx="0" cy="2286000"/>
           </a:xfrm>
           <a:prstGeom prst="line">
             <a:avLst/>
           </a:prstGeom>
+          <a:ln>
+            <a:headEnd type="arrow"/>
+          </a:ln>
         </p:spPr>
         <p:style>
           <a:lnRef idx="2">
@@ -4668,7 +4685,7 @@
         </p:nvCxnSpPr>
         <p:spPr>
           <a:xfrm flipH="1">
-            <a:off x="6376313" y="4952800"/>
+            <a:off x="6376313" y="5160793"/>
             <a:ext cx="5213350" cy="0"/>
           </a:xfrm>
           <a:prstGeom prst="line">
@@ -4704,7 +4721,7 @@
         </p:nvSpPr>
         <p:spPr>
           <a:xfrm>
-            <a:off x="6475026" y="3543602"/>
+            <a:off x="6475026" y="3751595"/>
             <a:ext cx="190500" cy="1409198"/>
           </a:xfrm>
           <a:prstGeom prst="roundRect">
@@ -4766,7 +4783,7 @@
         </p:nvSpPr>
         <p:spPr>
           <a:xfrm>
-            <a:off x="7331988" y="4587040"/>
+            <a:off x="7331988" y="4795033"/>
             <a:ext cx="190500" cy="365760"/>
           </a:xfrm>
           <a:prstGeom prst="roundRect">
@@ -4828,7 +4845,7 @@
         </p:nvSpPr>
         <p:spPr>
           <a:xfrm>
-            <a:off x="8203673" y="3855520"/>
+            <a:off x="8203673" y="4063513"/>
             <a:ext cx="190500" cy="1097280"/>
           </a:xfrm>
           <a:prstGeom prst="roundRect">
@@ -4890,7 +4907,7 @@
         </p:nvSpPr>
         <p:spPr>
           <a:xfrm>
-            <a:off x="8948500" y="4678480"/>
+            <a:off x="8948500" y="4886473"/>
             <a:ext cx="190500" cy="274320"/>
           </a:xfrm>
           <a:prstGeom prst="roundRect">
@@ -4952,7 +4969,7 @@
         </p:nvSpPr>
         <p:spPr>
           <a:xfrm>
-            <a:off x="9625504" y="4861360"/>
+            <a:off x="9625504" y="5069353"/>
             <a:ext cx="190500" cy="91440"/>
           </a:xfrm>
           <a:prstGeom prst="roundRect">
@@ -5014,7 +5031,7 @@
         </p:nvSpPr>
         <p:spPr>
           <a:xfrm>
-            <a:off x="10350688" y="4312720"/>
+            <a:off x="10350688" y="4520713"/>
             <a:ext cx="190500" cy="640080"/>
           </a:xfrm>
           <a:prstGeom prst="roundRect">
@@ -5076,7 +5093,7 @@
         </p:nvSpPr>
         <p:spPr>
           <a:xfrm>
-            <a:off x="6739125" y="4861360"/>
+            <a:off x="6739125" y="5069353"/>
             <a:ext cx="171873" cy="91440"/>
           </a:xfrm>
           <a:prstGeom prst="roundRect">
@@ -5135,7 +5152,7 @@
         </p:nvSpPr>
         <p:spPr>
           <a:xfrm>
-            <a:off x="8453986" y="2744060"/>
+            <a:off x="8453986" y="2952053"/>
             <a:ext cx="190494" cy="2208740"/>
           </a:xfrm>
           <a:prstGeom prst="roundRect">
@@ -5194,8 +5211,8 @@
         </p:nvSpPr>
         <p:spPr>
           <a:xfrm>
-            <a:off x="10595459" y="4678480"/>
-            <a:ext cx="190500" cy="274320"/>
+            <a:off x="10595459" y="4964107"/>
+            <a:ext cx="190500" cy="182880"/>
           </a:xfrm>
           <a:prstGeom prst="roundRect">
             <a:avLst/>
@@ -5253,7 +5270,7 @@
         </p:nvSpPr>
         <p:spPr>
           <a:xfrm>
-            <a:off x="5611231" y="2827367"/>
+            <a:off x="5611231" y="3512880"/>
             <a:ext cx="396373" cy="247282"/>
           </a:xfrm>
           <a:prstGeom prst="roundRect">
@@ -5315,7 +5332,7 @@
         </p:nvSpPr>
         <p:spPr>
           <a:xfrm>
-            <a:off x="5611231" y="3287872"/>
+            <a:off x="5611231" y="3973385"/>
             <a:ext cx="396373" cy="247282"/>
           </a:xfrm>
           <a:prstGeom prst="roundRect">
@@ -5377,7 +5394,7 @@
         </p:nvSpPr>
         <p:spPr>
           <a:xfrm>
-            <a:off x="11584842" y="2827367"/>
+            <a:off x="11584842" y="3512880"/>
             <a:ext cx="396373" cy="247282"/>
           </a:xfrm>
           <a:prstGeom prst="roundRect">
@@ -5439,7 +5456,7 @@
         </p:nvSpPr>
         <p:spPr>
           <a:xfrm>
-            <a:off x="11584842" y="3287872"/>
+            <a:off x="11584842" y="3973385"/>
             <a:ext cx="396373" cy="247282"/>
           </a:xfrm>
           <a:prstGeom prst="roundRect">
@@ -5513,7 +5530,7 @@
         </p:blipFill>
         <p:spPr bwMode="auto">
           <a:xfrm>
-            <a:off x="4068225" y="2767287"/>
+            <a:off x="4068225" y="3452800"/>
             <a:ext cx="1432360" cy="291946"/>
           </a:xfrm>
           <a:prstGeom prst="rect">
@@ -5560,7 +5577,7 @@
         </p:blipFill>
         <p:spPr bwMode="auto">
           <a:xfrm>
-            <a:off x="10019204" y="2805035"/>
+            <a:off x="10019204" y="3490548"/>
             <a:ext cx="1432360" cy="291946"/>
           </a:xfrm>
           <a:prstGeom prst="rect">
@@ -5607,7 +5624,7 @@
         </p:blipFill>
         <p:spPr bwMode="auto">
           <a:xfrm>
-            <a:off x="4004390" y="3263747"/>
+            <a:off x="4004390" y="3949260"/>
             <a:ext cx="1523710" cy="267905"/>
           </a:xfrm>
           <a:prstGeom prst="rect">
@@ -5654,7 +5671,7 @@
         </p:blipFill>
         <p:spPr bwMode="auto">
           <a:xfrm>
-            <a:off x="8869393" y="3234618"/>
+            <a:off x="8869393" y="3920131"/>
             <a:ext cx="2648223" cy="309993"/>
           </a:xfrm>
           <a:prstGeom prst="rect">
@@ -5688,7 +5705,7 @@
         </p:nvSpPr>
         <p:spPr>
           <a:xfrm>
-            <a:off x="309037" y="5334637"/>
+            <a:off x="616385" y="1470108"/>
             <a:ext cx="5159375" cy="743954"/>
           </a:xfrm>
           <a:prstGeom prst="rect">
@@ -5751,7 +5768,7 @@
         </p:nvSpPr>
         <p:spPr>
           <a:xfrm>
-            <a:off x="6447370" y="5334637"/>
+            <a:off x="6623653" y="1470108"/>
             <a:ext cx="5159375" cy="743954"/>
           </a:xfrm>
           <a:prstGeom prst="rect">
@@ -5798,6 +5815,254 @@
           </a:p>
         </p:txBody>
       </p:sp>
+      <p:pic>
+        <p:nvPicPr>
+          <p:cNvPr id="8" name="Picture 6" descr="p^\gamma_\theta&amp;(\mathbf{z}_s^{(\ell)}\mid\mathbf{z}_t^{(1:L)}, y) \propto \\&#10;&amp;p_\phi(y\mid\mathbf{z}_t^{(1:\ell-1)}, \mathbf{z}_s^{(\ell)}, \mathbf{z}_t^{(\ell+1:L)})^\gamma\cdot p_\theta(\mathbf{z}_s^{(\ell)}\mid\mathbf{z}_t^{(1:L)})">
+            <a:extLst>
+              <a:ext uri="{FF2B5EF4-FFF2-40B4-BE49-F238E27FC236}">
+                <a16:creationId xmlns:a16="http://schemas.microsoft.com/office/drawing/2014/main" id="{9D0D2550-B15B-F275-24A4-6EE84015FC94}"/>
+              </a:ext>
+            </a:extLst>
+          </p:cNvPr>
+          <p:cNvPicPr>
+            <a:picLocks noChangeAspect="1" noChangeArrowheads="1"/>
+          </p:cNvPicPr>
+          <p:nvPr/>
+        </p:nvPicPr>
+        <p:blipFill>
+          <a:blip r:embed="rId10">
+            <a:extLst>
+              <a:ext uri="{28A0092B-C50C-407E-A947-70E740481C1C}">
+                <a14:useLocalDpi xmlns:a14="http://schemas.microsoft.com/office/drawing/2010/main" val="0"/>
+              </a:ext>
+            </a:extLst>
+          </a:blip>
+          <a:srcRect/>
+          <a:stretch>
+            <a:fillRect/>
+          </a:stretch>
+        </p:blipFill>
+        <p:spPr bwMode="auto">
+          <a:xfrm>
+            <a:off x="7242881" y="2020573"/>
+            <a:ext cx="4725501" cy="732636"/>
+          </a:xfrm>
+          <a:prstGeom prst="rect">
+            <a:avLst/>
+          </a:prstGeom>
+          <a:noFill/>
+          <a:extLst>
+            <a:ext uri="{909E8E84-426E-40DD-AFC4-6F175D3DCCD1}">
+              <a14:hiddenFill xmlns:a14="http://schemas.microsoft.com/office/drawing/2010/main">
+                <a:solidFill>
+                  <a:srgbClr val="FFFFFF"/>
+                </a:solidFill>
+              </a14:hiddenFill>
+            </a:ext>
+          </a:extLst>
+        </p:spPr>
+      </p:pic>
+      <p:pic>
+        <p:nvPicPr>
+          <p:cNvPr id="11" name="Picture 10">
+            <a:extLst>
+              <a:ext uri="{FF2B5EF4-FFF2-40B4-BE49-F238E27FC236}">
+                <a16:creationId xmlns:a16="http://schemas.microsoft.com/office/drawing/2014/main" id="{E325F5BB-BD17-B4FE-8893-94EC66164262}"/>
+              </a:ext>
+            </a:extLst>
+          </p:cNvPr>
+          <p:cNvPicPr>
+            <a:picLocks noChangeAspect="1"/>
+          </p:cNvPicPr>
+          <p:nvPr/>
+        </p:nvPicPr>
+        <p:blipFill>
+          <a:blip r:embed="rId11"/>
+          <a:stretch>
+            <a:fillRect/>
+          </a:stretch>
+        </p:blipFill>
+        <p:spPr>
+          <a:xfrm>
+            <a:off x="272831" y="2915434"/>
+            <a:ext cx="161279" cy="188160"/>
+          </a:xfrm>
+          <a:prstGeom prst="rect">
+            <a:avLst/>
+          </a:prstGeom>
+        </p:spPr>
+      </p:pic>
+      <p:pic>
+        <p:nvPicPr>
+          <p:cNvPr id="17" name="Picture 16">
+            <a:extLst>
+              <a:ext uri="{FF2B5EF4-FFF2-40B4-BE49-F238E27FC236}">
+                <a16:creationId xmlns:a16="http://schemas.microsoft.com/office/drawing/2014/main" id="{1C1755CB-78F9-4A06-9E2C-923C2158F3CE}"/>
+              </a:ext>
+            </a:extLst>
+          </p:cNvPr>
+          <p:cNvPicPr>
+            <a:picLocks noChangeAspect="1"/>
+          </p:cNvPicPr>
+          <p:nvPr/>
+        </p:nvPicPr>
+        <p:blipFill>
+          <a:blip r:embed="rId12"/>
+          <a:stretch>
+            <a:fillRect/>
+          </a:stretch>
+        </p:blipFill>
+        <p:spPr>
+          <a:xfrm>
+            <a:off x="220948" y="5221798"/>
+            <a:ext cx="1117483" cy="209528"/>
+          </a:xfrm>
+          <a:prstGeom prst="rect">
+            <a:avLst/>
+          </a:prstGeom>
+        </p:spPr>
+      </p:pic>
+      <p:pic>
+        <p:nvPicPr>
+          <p:cNvPr id="1042" name="Picture 18" descr="p^\gamma_\theta&amp;(\mathbf{z}_s^{(\ell)}\mid\mathbf{z}_t^{(1:L)}, y) \propto \\&#10;&amp;p_\theta(\mathbf{z}_s^{(\ell)}\mid\mathbf{z}_t^{(1:L)}, y)^\gamma\cdot p_\theta(\mathbf{z}_s^{(\ell)}\mid\mathbf{z}_t^{(1:L)})^{1-\gamma}">
+            <a:extLst>
+              <a:ext uri="{FF2B5EF4-FFF2-40B4-BE49-F238E27FC236}">
+                <a16:creationId xmlns:a16="http://schemas.microsoft.com/office/drawing/2014/main" id="{E83033E7-28CF-B814-CE3D-2888800B1ACF}"/>
+              </a:ext>
+            </a:extLst>
+          </p:cNvPr>
+          <p:cNvPicPr>
+            <a:picLocks noChangeAspect="1" noChangeArrowheads="1"/>
+          </p:cNvPicPr>
+          <p:nvPr/>
+        </p:nvPicPr>
+        <p:blipFill>
+          <a:blip r:embed="rId13">
+            <a:extLst>
+              <a:ext uri="{28A0092B-C50C-407E-A947-70E740481C1C}">
+                <a14:useLocalDpi xmlns:a14="http://schemas.microsoft.com/office/drawing/2010/main" val="0"/>
+              </a:ext>
+            </a:extLst>
+          </a:blip>
+          <a:srcRect/>
+          <a:stretch>
+            <a:fillRect/>
+          </a:stretch>
+        </p:blipFill>
+        <p:spPr bwMode="auto">
+          <a:xfrm>
+            <a:off x="1103575" y="2084385"/>
+            <a:ext cx="4375496" cy="770968"/>
+          </a:xfrm>
+          <a:prstGeom prst="rect">
+            <a:avLst/>
+          </a:prstGeom>
+          <a:noFill/>
+          <a:extLst>
+            <a:ext uri="{909E8E84-426E-40DD-AFC4-6F175D3DCCD1}">
+              <a14:hiddenFill xmlns:a14="http://schemas.microsoft.com/office/drawing/2010/main">
+                <a:solidFill>
+                  <a:srgbClr val="FFFFFF"/>
+                </a:solidFill>
+              </a14:hiddenFill>
+            </a:ext>
+          </a:extLst>
+        </p:spPr>
+      </p:pic>
+      <p:pic>
+        <p:nvPicPr>
+          <p:cNvPr id="7" name="Picture 6" descr="\overbrace{~~~~~~~~~}^{\mathbf{z}_t^{(\ell)}}">
+            <a:extLst>
+              <a:ext uri="{FF2B5EF4-FFF2-40B4-BE49-F238E27FC236}">
+                <a16:creationId xmlns:a16="http://schemas.microsoft.com/office/drawing/2014/main" id="{1CF2E556-3B16-AD33-2267-DA25C6BD0D53}"/>
+              </a:ext>
+            </a:extLst>
+          </p:cNvPr>
+          <p:cNvPicPr>
+            <a:picLocks noChangeAspect="1" noChangeArrowheads="1"/>
+          </p:cNvPicPr>
+          <p:nvPr/>
+        </p:nvPicPr>
+        <p:blipFill>
+          <a:blip r:embed="rId14">
+            <a:extLst>
+              <a:ext uri="{28A0092B-C50C-407E-A947-70E740481C1C}">
+                <a14:useLocalDpi xmlns:a14="http://schemas.microsoft.com/office/drawing/2010/main" val="0"/>
+              </a:ext>
+            </a:extLst>
+          </a:blip>
+          <a:srcRect/>
+          <a:stretch>
+            <a:fillRect/>
+          </a:stretch>
+        </p:blipFill>
+        <p:spPr bwMode="auto">
+          <a:xfrm>
+            <a:off x="4673564" y="5863726"/>
+            <a:ext cx="779714" cy="425299"/>
+          </a:xfrm>
+          <a:prstGeom prst="rect">
+            <a:avLst/>
+          </a:prstGeom>
+          <a:noFill/>
+          <a:extLst>
+            <a:ext uri="{909E8E84-426E-40DD-AFC4-6F175D3DCCD1}">
+              <a14:hiddenFill xmlns:a14="http://schemas.microsoft.com/office/drawing/2010/main">
+                <a:solidFill>
+                  <a:srgbClr val="FFFFFF"/>
+                </a:solidFill>
+              </a14:hiddenFill>
+            </a:ext>
+          </a:extLst>
+        </p:spPr>
+      </p:pic>
+      <p:pic>
+        <p:nvPicPr>
+          <p:cNvPr id="9" name="Picture 8" descr="\overbrace{~~~~~~~~~}^{\mathbf{z}_s^{(\ell)}}">
+            <a:extLst>
+              <a:ext uri="{FF2B5EF4-FFF2-40B4-BE49-F238E27FC236}">
+                <a16:creationId xmlns:a16="http://schemas.microsoft.com/office/drawing/2014/main" id="{22F2E342-EF65-876E-0D26-8383C4D11AFE}"/>
+              </a:ext>
+            </a:extLst>
+          </p:cNvPr>
+          <p:cNvPicPr>
+            <a:picLocks noChangeAspect="1" noChangeArrowheads="1"/>
+          </p:cNvPicPr>
+          <p:nvPr/>
+        </p:nvPicPr>
+        <p:blipFill>
+          <a:blip r:embed="rId15">
+            <a:extLst>
+              <a:ext uri="{28A0092B-C50C-407E-A947-70E740481C1C}">
+                <a14:useLocalDpi xmlns:a14="http://schemas.microsoft.com/office/drawing/2010/main" val="0"/>
+              </a:ext>
+            </a:extLst>
+          </a:blip>
+          <a:srcRect/>
+          <a:stretch>
+            <a:fillRect/>
+          </a:stretch>
+        </p:blipFill>
+        <p:spPr bwMode="auto">
+          <a:xfrm>
+            <a:off x="3071811" y="178572"/>
+            <a:ext cx="732078" cy="399315"/>
+          </a:xfrm>
+          <a:prstGeom prst="rect">
+            <a:avLst/>
+          </a:prstGeom>
+          <a:noFill/>
+          <a:extLst>
+            <a:ext uri="{909E8E84-426E-40DD-AFC4-6F175D3DCCD1}">
+              <a14:hiddenFill xmlns:a14="http://schemas.microsoft.com/office/drawing/2010/main">
+                <a:solidFill>
+                  <a:srgbClr val="FFFFFF"/>
+                </a:solidFill>
+              </a14:hiddenFill>
+            </a:ext>
+          </a:extLst>
+        </p:spPr>
+      </p:pic>
     </p:spTree>
     <p:extLst>
       <p:ext uri="{BB962C8B-B14F-4D97-AF65-F5344CB8AC3E}">

</xml_diff>